<commit_message>
Added final presentation :ballot_box_with_check:
</commit_message>
<xml_diff>
--- a/documentation/RoomNet Presentation.pptx
+++ b/documentation/RoomNet Presentation.pptx
@@ -9,6 +9,9 @@
     <p:sldId id="257" r:id="rId3"/>
     <p:sldId id="259" r:id="rId4"/>
     <p:sldId id="260" r:id="rId5"/>
+    <p:sldId id="261" r:id="rId6"/>
+    <p:sldId id="262" r:id="rId7"/>
+    <p:sldId id="263" r:id="rId8"/>
   </p:sldIdLst>
   <p:sldSz cx="12192000" cy="6858000"/>
   <p:notesSz cx="6858000" cy="9144000"/>
@@ -113,6 +116,144 @@
     </p:ext>
   </p:extLst>
 </p:presentation>
+</file>
+
+<file path=ppt/revisionInfo.xml><?xml version="1.0" encoding="utf-8"?>
+<p1510:revInfo xmlns:a="http://schemas.openxmlformats.org/drawingml/2006/main" xmlns:r="http://schemas.openxmlformats.org/officeDocument/2006/relationships" xmlns:p1510="http://schemas.microsoft.com/office/powerpoint/2015/10/main">
+  <p1510:revLst>
+    <p1510:client id="{39F46D0C-A58B-495C-853F-CAE419FAB084}" v="10" dt="2019-07-08T17:56:42.538"/>
+  </p1510:revLst>
+</p1510:revInfo>
+</file>
+
+<file path=ppt/changesInfos/changesInfo1.xml><?xml version="1.0" encoding="utf-8"?>
+<pc:chgInfo xmlns:a="http://schemas.openxmlformats.org/drawingml/2006/main" xmlns:r="http://schemas.openxmlformats.org/officeDocument/2006/relationships" xmlns:ac="http://schemas.microsoft.com/office/drawing/2013/main/command" xmlns:pc="http://schemas.microsoft.com/office/powerpoint/2013/main/command">
+  <pc:docChgLst>
+    <pc:chgData name="Souham Biswas" userId="3b26487c8d24dc00" providerId="LiveId" clId="{39F46D0C-A58B-495C-853F-CAE419FAB084}"/>
+    <pc:docChg chg="custSel addSld delSld modSld">
+      <pc:chgData name="Souham Biswas" userId="3b26487c8d24dc00" providerId="LiveId" clId="{39F46D0C-A58B-495C-853F-CAE419FAB084}" dt="2019-07-08T17:56:53.550" v="161" actId="1076"/>
+      <pc:docMkLst>
+        <pc:docMk/>
+      </pc:docMkLst>
+      <pc:sldChg chg="addSp delSp modSp add">
+        <pc:chgData name="Souham Biswas" userId="3b26487c8d24dc00" providerId="LiveId" clId="{39F46D0C-A58B-495C-853F-CAE419FAB084}" dt="2019-07-08T16:54:06.884" v="62" actId="1076"/>
+        <pc:sldMkLst>
+          <pc:docMk/>
+          <pc:sldMk cId="3567671924" sldId="261"/>
+        </pc:sldMkLst>
+        <pc:spChg chg="mod">
+          <ac:chgData name="Souham Biswas" userId="3b26487c8d24dc00" providerId="LiveId" clId="{39F46D0C-A58B-495C-853F-CAE419FAB084}" dt="2019-07-08T16:53:15.481" v="53" actId="20577"/>
+          <ac:spMkLst>
+            <pc:docMk/>
+            <pc:sldMk cId="3567671924" sldId="261"/>
+            <ac:spMk id="2" creationId="{8A41F784-1A0A-4068-8B37-A7F498DA2B99}"/>
+          </ac:spMkLst>
+        </pc:spChg>
+        <pc:spChg chg="del">
+          <ac:chgData name="Souham Biswas" userId="3b26487c8d24dc00" providerId="LiveId" clId="{39F46D0C-A58B-495C-853F-CAE419FAB084}" dt="2019-07-08T16:53:40.497" v="54"/>
+          <ac:spMkLst>
+            <pc:docMk/>
+            <pc:sldMk cId="3567671924" sldId="261"/>
+            <ac:spMk id="3" creationId="{69CE22B2-9389-4488-9D27-3C7EC3544318}"/>
+          </ac:spMkLst>
+        </pc:spChg>
+        <pc:picChg chg="add mod">
+          <ac:chgData name="Souham Biswas" userId="3b26487c8d24dc00" providerId="LiveId" clId="{39F46D0C-A58B-495C-853F-CAE419FAB084}" dt="2019-07-08T16:54:06.884" v="62" actId="1076"/>
+          <ac:picMkLst>
+            <pc:docMk/>
+            <pc:sldMk cId="3567671924" sldId="261"/>
+            <ac:picMk id="5" creationId="{A90BF011-A12D-4F26-AA08-306F586CC723}"/>
+          </ac:picMkLst>
+        </pc:picChg>
+      </pc:sldChg>
+      <pc:sldChg chg="addSp delSp modSp add">
+        <pc:chgData name="Souham Biswas" userId="3b26487c8d24dc00" providerId="LiveId" clId="{39F46D0C-A58B-495C-853F-CAE419FAB084}" dt="2019-07-08T17:54:00.747" v="132" actId="14100"/>
+        <pc:sldMkLst>
+          <pc:docMk/>
+          <pc:sldMk cId="12900511" sldId="262"/>
+        </pc:sldMkLst>
+        <pc:spChg chg="mod">
+          <ac:chgData name="Souham Biswas" userId="3b26487c8d24dc00" providerId="LiveId" clId="{39F46D0C-A58B-495C-853F-CAE419FAB084}" dt="2019-07-08T17:53:47.274" v="129" actId="1076"/>
+          <ac:spMkLst>
+            <pc:docMk/>
+            <pc:sldMk cId="12900511" sldId="262"/>
+            <ac:spMk id="2" creationId="{3BE64E5E-FE4F-47BE-BFA7-D75A4EFDA1DF}"/>
+          </ac:spMkLst>
+        </pc:spChg>
+        <pc:spChg chg="del">
+          <ac:chgData name="Souham Biswas" userId="3b26487c8d24dc00" providerId="LiveId" clId="{39F46D0C-A58B-495C-853F-CAE419FAB084}" dt="2019-07-08T16:55:22.299" v="110"/>
+          <ac:spMkLst>
+            <pc:docMk/>
+            <pc:sldMk cId="12900511" sldId="262"/>
+            <ac:spMk id="3" creationId="{95F2DA0B-B3E8-43CD-89A9-6A3E3AEB9DD7}"/>
+          </ac:spMkLst>
+        </pc:spChg>
+        <pc:picChg chg="add mod">
+          <ac:chgData name="Souham Biswas" userId="3b26487c8d24dc00" providerId="LiveId" clId="{39F46D0C-A58B-495C-853F-CAE419FAB084}" dt="2019-07-08T17:54:00.747" v="132" actId="14100"/>
+          <ac:picMkLst>
+            <pc:docMk/>
+            <pc:sldMk cId="12900511" sldId="262"/>
+            <ac:picMk id="5" creationId="{28B3D0F0-5364-47D4-9E10-061D5356AE59}"/>
+          </ac:picMkLst>
+        </pc:picChg>
+      </pc:sldChg>
+      <pc:sldChg chg="addSp delSp modSp add">
+        <pc:chgData name="Souham Biswas" userId="3b26487c8d24dc00" providerId="LiveId" clId="{39F46D0C-A58B-495C-853F-CAE419FAB084}" dt="2019-07-08T17:56:53.550" v="161" actId="1076"/>
+        <pc:sldMkLst>
+          <pc:docMk/>
+          <pc:sldMk cId="165439621" sldId="263"/>
+        </pc:sldMkLst>
+        <pc:spChg chg="mod">
+          <ac:chgData name="Souham Biswas" userId="3b26487c8d24dc00" providerId="LiveId" clId="{39F46D0C-A58B-495C-853F-CAE419FAB084}" dt="2019-07-08T17:56:32.963" v="154" actId="1076"/>
+          <ac:spMkLst>
+            <pc:docMk/>
+            <pc:sldMk cId="165439621" sldId="263"/>
+            <ac:spMk id="2" creationId="{3BE64E5E-FE4F-47BE-BFA7-D75A4EFDA1DF}"/>
+          </ac:spMkLst>
+        </pc:spChg>
+        <pc:spChg chg="add del mod">
+          <ac:chgData name="Souham Biswas" userId="3b26487c8d24dc00" providerId="LiveId" clId="{39F46D0C-A58B-495C-853F-CAE419FAB084}" dt="2019-07-08T17:56:42.538" v="156"/>
+          <ac:spMkLst>
+            <pc:docMk/>
+            <pc:sldMk cId="165439621" sldId="263"/>
+            <ac:spMk id="4" creationId="{862A9E16-10EB-483E-BF03-8ED251707052}"/>
+          </ac:spMkLst>
+        </pc:spChg>
+        <pc:picChg chg="del">
+          <ac:chgData name="Souham Biswas" userId="3b26487c8d24dc00" providerId="LiveId" clId="{39F46D0C-A58B-495C-853F-CAE419FAB084}" dt="2019-07-08T17:56:35.141" v="155" actId="478"/>
+          <ac:picMkLst>
+            <pc:docMk/>
+            <pc:sldMk cId="165439621" sldId="263"/>
+            <ac:picMk id="5" creationId="{28B3D0F0-5364-47D4-9E10-061D5356AE59}"/>
+          </ac:picMkLst>
+        </pc:picChg>
+        <pc:picChg chg="add mod">
+          <ac:chgData name="Souham Biswas" userId="3b26487c8d24dc00" providerId="LiveId" clId="{39F46D0C-A58B-495C-853F-CAE419FAB084}" dt="2019-07-08T17:56:53.550" v="161" actId="1076"/>
+          <ac:picMkLst>
+            <pc:docMk/>
+            <pc:sldMk cId="165439621" sldId="263"/>
+            <ac:picMk id="7" creationId="{1357165E-7FD9-42C6-913B-6CDFA05B8A03}"/>
+          </ac:picMkLst>
+        </pc:picChg>
+      </pc:sldChg>
+      <pc:sldChg chg="modSp add del">
+        <pc:chgData name="Souham Biswas" userId="3b26487c8d24dc00" providerId="LiveId" clId="{39F46D0C-A58B-495C-853F-CAE419FAB084}" dt="2019-07-08T17:56:07.492" v="133" actId="2696"/>
+        <pc:sldMkLst>
+          <pc:docMk/>
+          <pc:sldMk cId="2418719056" sldId="263"/>
+        </pc:sldMkLst>
+        <pc:spChg chg="mod">
+          <ac:chgData name="Souham Biswas" userId="3b26487c8d24dc00" providerId="LiveId" clId="{39F46D0C-A58B-495C-853F-CAE419FAB084}" dt="2019-07-08T17:52:29.494" v="120" actId="1076"/>
+          <ac:spMkLst>
+            <pc:docMk/>
+            <pc:sldMk cId="2418719056" sldId="263"/>
+            <ac:spMk id="2" creationId="{53B135E8-F61B-410F-BD2E-E73DD0BE4663}"/>
+          </ac:spMkLst>
+        </pc:spChg>
+      </pc:sldChg>
+    </pc:docChg>
+  </pc:docChgLst>
+</pc:chgInfo>
 </file>
 
 <file path=ppt/slideLayouts/slideLayout1.xml><?xml version="1.0" encoding="utf-8"?>
@@ -13730,6 +13871,289 @@
 </p:sld>
 </file>
 
+<file path=ppt/slides/slide5.xml><?xml version="1.0" encoding="utf-8"?>
+<p:sld xmlns:a="http://schemas.openxmlformats.org/drawingml/2006/main" xmlns:r="http://schemas.openxmlformats.org/officeDocument/2006/relationships" xmlns:p="http://schemas.openxmlformats.org/presentationml/2006/main">
+  <p:cSld>
+    <p:spTree>
+      <p:nvGrpSpPr>
+        <p:cNvPr id="1" name=""/>
+        <p:cNvGrpSpPr/>
+        <p:nvPr/>
+      </p:nvGrpSpPr>
+      <p:grpSpPr>
+        <a:xfrm>
+          <a:off x="0" y="0"/>
+          <a:ext cx="0" cy="0"/>
+          <a:chOff x="0" y="0"/>
+          <a:chExt cx="0" cy="0"/>
+        </a:xfrm>
+      </p:grpSpPr>
+      <p:sp>
+        <p:nvSpPr>
+          <p:cNvPr id="2" name="Title 1">
+            <a:extLst>
+              <a:ext uri="{FF2B5EF4-FFF2-40B4-BE49-F238E27FC236}">
+                <a16:creationId xmlns:a16="http://schemas.microsoft.com/office/drawing/2014/main" id="{8A41F784-1A0A-4068-8B37-A7F498DA2B99}"/>
+              </a:ext>
+            </a:extLst>
+          </p:cNvPr>
+          <p:cNvSpPr>
+            <a:spLocks noGrp="1"/>
+          </p:cNvSpPr>
+          <p:nvPr>
+            <p:ph type="title"/>
+          </p:nvPr>
+        </p:nvSpPr>
+        <p:spPr/>
+        <p:txBody>
+          <a:bodyPr/>
+          <a:lstStyle/>
+          <a:p>
+            <a:r>
+              <a:rPr lang="en-US" dirty="0"/>
+              <a:t>Validation Accuracy plot</a:t>
+            </a:r>
+          </a:p>
+        </p:txBody>
+      </p:sp>
+      <p:pic>
+        <p:nvPicPr>
+          <p:cNvPr id="5" name="Content Placeholder 4" descr="A screenshot of a cell phone&#10;&#10;Description automatically generated">
+            <a:extLst>
+              <a:ext uri="{FF2B5EF4-FFF2-40B4-BE49-F238E27FC236}">
+                <a16:creationId xmlns:a16="http://schemas.microsoft.com/office/drawing/2014/main" id="{A90BF011-A12D-4F26-AA08-306F586CC723}"/>
+              </a:ext>
+            </a:extLst>
+          </p:cNvPr>
+          <p:cNvPicPr>
+            <a:picLocks noGrp="1" noChangeAspect="1"/>
+          </p:cNvPicPr>
+          <p:nvPr>
+            <p:ph idx="1"/>
+          </p:nvPr>
+        </p:nvPicPr>
+        <p:blipFill>
+          <a:blip r:embed="rId2"/>
+          <a:stretch>
+            <a:fillRect/>
+          </a:stretch>
+        </p:blipFill>
+        <p:spPr>
+          <a:xfrm>
+            <a:off x="3547178" y="2322300"/>
+            <a:ext cx="5247572" cy="4235669"/>
+          </a:xfrm>
+        </p:spPr>
+      </p:pic>
+    </p:spTree>
+    <p:extLst>
+      <p:ext uri="{BB962C8B-B14F-4D97-AF65-F5344CB8AC3E}">
+        <p14:creationId xmlns:p14="http://schemas.microsoft.com/office/powerpoint/2010/main" val="3567671924"/>
+      </p:ext>
+    </p:extLst>
+  </p:cSld>
+  <p:clrMapOvr>
+    <a:masterClrMapping/>
+  </p:clrMapOvr>
+</p:sld>
+</file>
+
+<file path=ppt/slides/slide6.xml><?xml version="1.0" encoding="utf-8"?>
+<p:sld xmlns:a="http://schemas.openxmlformats.org/drawingml/2006/main" xmlns:r="http://schemas.openxmlformats.org/officeDocument/2006/relationships" xmlns:p="http://schemas.openxmlformats.org/presentationml/2006/main">
+  <p:cSld>
+    <p:spTree>
+      <p:nvGrpSpPr>
+        <p:cNvPr id="1" name=""/>
+        <p:cNvGrpSpPr/>
+        <p:nvPr/>
+      </p:nvGrpSpPr>
+      <p:grpSpPr>
+        <a:xfrm>
+          <a:off x="0" y="0"/>
+          <a:ext cx="0" cy="0"/>
+          <a:chOff x="0" y="0"/>
+          <a:chExt cx="0" cy="0"/>
+        </a:xfrm>
+      </p:grpSpPr>
+      <p:sp>
+        <p:nvSpPr>
+          <p:cNvPr id="2" name="Title 1">
+            <a:extLst>
+              <a:ext uri="{FF2B5EF4-FFF2-40B4-BE49-F238E27FC236}">
+                <a16:creationId xmlns:a16="http://schemas.microsoft.com/office/drawing/2014/main" id="{3BE64E5E-FE4F-47BE-BFA7-D75A4EFDA1DF}"/>
+              </a:ext>
+            </a:extLst>
+          </p:cNvPr>
+          <p:cNvSpPr>
+            <a:spLocks noGrp="1"/>
+          </p:cNvSpPr>
+          <p:nvPr>
+            <p:ph type="title"/>
+          </p:nvPr>
+        </p:nvSpPr>
+        <p:spPr>
+          <a:xfrm>
+            <a:off x="2917645" y="0"/>
+            <a:ext cx="5987815" cy="337930"/>
+          </a:xfrm>
+        </p:spPr>
+        <p:txBody>
+          <a:bodyPr/>
+          <a:lstStyle/>
+          <a:p>
+            <a:r>
+              <a:rPr lang="en-US" sz="2800" dirty="0">
+                <a:solidFill>
+                  <a:schemeClr val="bg1">
+                    <a:lumMod val="50000"/>
+                  </a:schemeClr>
+                </a:solidFill>
+              </a:rPr>
+              <a:t>Class-wise Validation F-Score Plot</a:t>
+            </a:r>
+          </a:p>
+        </p:txBody>
+      </p:sp>
+      <p:pic>
+        <p:nvPicPr>
+          <p:cNvPr id="5" name="Content Placeholder 4" descr="A close up of a logo&#10;&#10;Description automatically generated">
+            <a:extLst>
+              <a:ext uri="{FF2B5EF4-FFF2-40B4-BE49-F238E27FC236}">
+                <a16:creationId xmlns:a16="http://schemas.microsoft.com/office/drawing/2014/main" id="{28B3D0F0-5364-47D4-9E10-061D5356AE59}"/>
+              </a:ext>
+            </a:extLst>
+          </p:cNvPr>
+          <p:cNvPicPr>
+            <a:picLocks noGrp="1" noChangeAspect="1"/>
+          </p:cNvPicPr>
+          <p:nvPr>
+            <p:ph idx="1"/>
+          </p:nvPr>
+        </p:nvPicPr>
+        <p:blipFill>
+          <a:blip r:embed="rId2"/>
+          <a:stretch>
+            <a:fillRect/>
+          </a:stretch>
+        </p:blipFill>
+        <p:spPr>
+          <a:xfrm>
+            <a:off x="2677238" y="404900"/>
+            <a:ext cx="5843910" cy="6326105"/>
+          </a:xfrm>
+        </p:spPr>
+      </p:pic>
+    </p:spTree>
+    <p:extLst>
+      <p:ext uri="{BB962C8B-B14F-4D97-AF65-F5344CB8AC3E}">
+        <p14:creationId xmlns:p14="http://schemas.microsoft.com/office/powerpoint/2010/main" val="12900511"/>
+      </p:ext>
+    </p:extLst>
+  </p:cSld>
+  <p:clrMapOvr>
+    <a:masterClrMapping/>
+  </p:clrMapOvr>
+</p:sld>
+</file>
+
+<file path=ppt/slides/slide7.xml><?xml version="1.0" encoding="utf-8"?>
+<p:sld xmlns:a="http://schemas.openxmlformats.org/drawingml/2006/main" xmlns:r="http://schemas.openxmlformats.org/officeDocument/2006/relationships" xmlns:p="http://schemas.openxmlformats.org/presentationml/2006/main">
+  <p:cSld>
+    <p:spTree>
+      <p:nvGrpSpPr>
+        <p:cNvPr id="1" name=""/>
+        <p:cNvGrpSpPr/>
+        <p:nvPr/>
+      </p:nvGrpSpPr>
+      <p:grpSpPr>
+        <a:xfrm>
+          <a:off x="0" y="0"/>
+          <a:ext cx="0" cy="0"/>
+          <a:chOff x="0" y="0"/>
+          <a:chExt cx="0" cy="0"/>
+        </a:xfrm>
+      </p:grpSpPr>
+      <p:sp>
+        <p:nvSpPr>
+          <p:cNvPr id="2" name="Title 1">
+            <a:extLst>
+              <a:ext uri="{FF2B5EF4-FFF2-40B4-BE49-F238E27FC236}">
+                <a16:creationId xmlns:a16="http://schemas.microsoft.com/office/drawing/2014/main" id="{3BE64E5E-FE4F-47BE-BFA7-D75A4EFDA1DF}"/>
+              </a:ext>
+            </a:extLst>
+          </p:cNvPr>
+          <p:cNvSpPr>
+            <a:spLocks noGrp="1"/>
+          </p:cNvSpPr>
+          <p:nvPr>
+            <p:ph type="title"/>
+          </p:nvPr>
+        </p:nvSpPr>
+        <p:spPr>
+          <a:xfrm>
+            <a:off x="2326989" y="0"/>
+            <a:ext cx="6544407" cy="337930"/>
+          </a:xfrm>
+        </p:spPr>
+        <p:txBody>
+          <a:bodyPr/>
+          <a:lstStyle/>
+          <a:p>
+            <a:r>
+              <a:rPr lang="en-US" sz="2800" dirty="0">
+                <a:solidFill>
+                  <a:schemeClr val="bg1">
+                    <a:lumMod val="50000"/>
+                  </a:schemeClr>
+                </a:solidFill>
+              </a:rPr>
+              <a:t>Class-wise Validation Precision Plot</a:t>
+            </a:r>
+          </a:p>
+        </p:txBody>
+      </p:sp>
+      <p:pic>
+        <p:nvPicPr>
+          <p:cNvPr id="7" name="Content Placeholder 6" descr="A close up of a logo&#10;&#10;Description automatically generated">
+            <a:extLst>
+              <a:ext uri="{FF2B5EF4-FFF2-40B4-BE49-F238E27FC236}">
+                <a16:creationId xmlns:a16="http://schemas.microsoft.com/office/drawing/2014/main" id="{1357165E-7FD9-42C6-913B-6CDFA05B8A03}"/>
+              </a:ext>
+            </a:extLst>
+          </p:cNvPr>
+          <p:cNvPicPr>
+            <a:picLocks noGrp="1" noChangeAspect="1"/>
+          </p:cNvPicPr>
+          <p:nvPr>
+            <p:ph idx="1"/>
+          </p:nvPr>
+        </p:nvPicPr>
+        <p:blipFill>
+          <a:blip r:embed="rId2"/>
+          <a:stretch>
+            <a:fillRect/>
+          </a:stretch>
+        </p:blipFill>
+        <p:spPr>
+          <a:xfrm>
+            <a:off x="2399300" y="439202"/>
+            <a:ext cx="5929537" cy="6418798"/>
+          </a:xfrm>
+        </p:spPr>
+      </p:pic>
+    </p:spTree>
+    <p:extLst>
+      <p:ext uri="{BB962C8B-B14F-4D97-AF65-F5344CB8AC3E}">
+        <p14:creationId xmlns:p14="http://schemas.microsoft.com/office/powerpoint/2010/main" val="165439621"/>
+      </p:ext>
+    </p:extLst>
+  </p:cSld>
+  <p:clrMapOvr>
+    <a:masterClrMapping/>
+  </p:clrMapOvr>
+</p:sld>
+</file>
+
 <file path=ppt/theme/theme1.xml><?xml version="1.0" encoding="utf-8"?>
 <a:theme xmlns:a="http://schemas.openxmlformats.org/drawingml/2006/main" name="Ion Boardroom">
   <a:themeElements>

</xml_diff>